<commit_message>
change subfigure letters to lowercase
</commit_message>
<xml_diff>
--- a/figures/figure-workflow/figure1-new.pptx
+++ b/figures/figure-workflow/figure1-new.pptx
@@ -243,7 +243,7 @@
           <a:p>
             <a:fld id="{36D6B43A-FB72-2B4A-8DB0-B6C23179BADB}" type="datetimeFigureOut">
               <a:rPr lang="en-US" smtClean="0"/>
-              <a:t>5/30/22</a:t>
+              <a:t>5/19/23</a:t>
             </a:fld>
             <a:endParaRPr lang="en-US"/>
           </a:p>
@@ -413,7 +413,7 @@
           <a:p>
             <a:fld id="{36D6B43A-FB72-2B4A-8DB0-B6C23179BADB}" type="datetimeFigureOut">
               <a:rPr lang="en-US" smtClean="0"/>
-              <a:t>5/30/22</a:t>
+              <a:t>5/19/23</a:t>
             </a:fld>
             <a:endParaRPr lang="en-US"/>
           </a:p>
@@ -593,7 +593,7 @@
           <a:p>
             <a:fld id="{36D6B43A-FB72-2B4A-8DB0-B6C23179BADB}" type="datetimeFigureOut">
               <a:rPr lang="en-US" smtClean="0"/>
-              <a:t>5/30/22</a:t>
+              <a:t>5/19/23</a:t>
             </a:fld>
             <a:endParaRPr lang="en-US"/>
           </a:p>
@@ -763,7 +763,7 @@
           <a:p>
             <a:fld id="{36D6B43A-FB72-2B4A-8DB0-B6C23179BADB}" type="datetimeFigureOut">
               <a:rPr lang="en-US" smtClean="0"/>
-              <a:t>5/30/22</a:t>
+              <a:t>5/19/23</a:t>
             </a:fld>
             <a:endParaRPr lang="en-US"/>
           </a:p>
@@ -1009,7 +1009,7 @@
           <a:p>
             <a:fld id="{36D6B43A-FB72-2B4A-8DB0-B6C23179BADB}" type="datetimeFigureOut">
               <a:rPr lang="en-US" smtClean="0"/>
-              <a:t>5/30/22</a:t>
+              <a:t>5/19/23</a:t>
             </a:fld>
             <a:endParaRPr lang="en-US"/>
           </a:p>
@@ -1241,7 +1241,7 @@
           <a:p>
             <a:fld id="{36D6B43A-FB72-2B4A-8DB0-B6C23179BADB}" type="datetimeFigureOut">
               <a:rPr lang="en-US" smtClean="0"/>
-              <a:t>5/30/22</a:t>
+              <a:t>5/19/23</a:t>
             </a:fld>
             <a:endParaRPr lang="en-US"/>
           </a:p>
@@ -1608,7 +1608,7 @@
           <a:p>
             <a:fld id="{36D6B43A-FB72-2B4A-8DB0-B6C23179BADB}" type="datetimeFigureOut">
               <a:rPr lang="en-US" smtClean="0"/>
-              <a:t>5/30/22</a:t>
+              <a:t>5/19/23</a:t>
             </a:fld>
             <a:endParaRPr lang="en-US"/>
           </a:p>
@@ -1726,7 +1726,7 @@
           <a:p>
             <a:fld id="{36D6B43A-FB72-2B4A-8DB0-B6C23179BADB}" type="datetimeFigureOut">
               <a:rPr lang="en-US" smtClean="0"/>
-              <a:t>5/30/22</a:t>
+              <a:t>5/19/23</a:t>
             </a:fld>
             <a:endParaRPr lang="en-US"/>
           </a:p>
@@ -1821,7 +1821,7 @@
           <a:p>
             <a:fld id="{36D6B43A-FB72-2B4A-8DB0-B6C23179BADB}" type="datetimeFigureOut">
               <a:rPr lang="en-US" smtClean="0"/>
-              <a:t>5/30/22</a:t>
+              <a:t>5/19/23</a:t>
             </a:fld>
             <a:endParaRPr lang="en-US"/>
           </a:p>
@@ -2098,7 +2098,7 @@
           <a:p>
             <a:fld id="{36D6B43A-FB72-2B4A-8DB0-B6C23179BADB}" type="datetimeFigureOut">
               <a:rPr lang="en-US" smtClean="0"/>
-              <a:t>5/30/22</a:t>
+              <a:t>5/19/23</a:t>
             </a:fld>
             <a:endParaRPr lang="en-US"/>
           </a:p>
@@ -2355,7 +2355,7 @@
           <a:p>
             <a:fld id="{36D6B43A-FB72-2B4A-8DB0-B6C23179BADB}" type="datetimeFigureOut">
               <a:rPr lang="en-US" smtClean="0"/>
-              <a:t>5/30/22</a:t>
+              <a:t>5/19/23</a:t>
             </a:fld>
             <a:endParaRPr lang="en-US"/>
           </a:p>
@@ -2568,7 +2568,7 @@
           <a:p>
             <a:fld id="{36D6B43A-FB72-2B4A-8DB0-B6C23179BADB}" type="datetimeFigureOut">
               <a:rPr lang="en-US" smtClean="0"/>
-              <a:t>5/30/22</a:t>
+              <a:t>5/19/23</a:t>
             </a:fld>
             <a:endParaRPr lang="en-US"/>
           </a:p>
@@ -3157,7 +3157,7 @@
         </p:nvSpPr>
         <p:spPr>
           <a:xfrm>
-            <a:off x="5799936" y="4009450"/>
+            <a:off x="5676270" y="4110335"/>
             <a:ext cx="3096675" cy="923330"/>
           </a:xfrm>
           <a:prstGeom prst="rect">
@@ -3171,10 +3171,10 @@
           </a:bodyPr>
           <a:lstStyle/>
           <a:p>
-            <a:pPr algn="r"/>
-            <a:r>
-              <a:rPr lang="en-US" dirty="0"/>
-              <a:t>C2) </a:t>
+            <a:pPr algn="ctr"/>
+            <a:r>
+              <a:rPr lang="en-US" b="1" dirty="0"/>
+              <a:t>c2) </a:t>
             </a:r>
             <a:r>
               <a:rPr lang="en-US" b="1" dirty="0" err="1"/>
@@ -3201,7 +3201,7 @@
         </p:nvSpPr>
         <p:spPr>
           <a:xfrm>
-            <a:off x="9884895" y="4523948"/>
+            <a:off x="10113323" y="4497627"/>
             <a:ext cx="2981651" cy="369332"/>
           </a:xfrm>
           <a:prstGeom prst="rect">
@@ -3217,8 +3217,12 @@
           <a:p>
             <a:pPr algn="ctr"/>
             <a:r>
+              <a:rPr lang="en-US" b="1" dirty="0"/>
+              <a:t>c1) </a:t>
+            </a:r>
+            <a:r>
               <a:rPr lang="en-US" dirty="0"/>
-              <a:t>C1) Choose a </a:t>
+              <a:t>Choose a </a:t>
             </a:r>
             <a:r>
               <a:rPr lang="en-US" b="1" dirty="0"/>
@@ -3241,7 +3245,7 @@
         </p:nvSpPr>
         <p:spPr>
           <a:xfrm rot="10800000" flipV="1">
-            <a:off x="4792750" y="4162918"/>
+            <a:off x="4558974" y="4385218"/>
             <a:ext cx="958778" cy="389958"/>
           </a:xfrm>
           <a:prstGeom prst="rightArrow">
@@ -3303,8 +3307,8 @@
         </p:nvSpPr>
         <p:spPr>
           <a:xfrm>
-            <a:off x="1259478" y="4001766"/>
-            <a:ext cx="3432702" cy="646331"/>
+            <a:off x="355158" y="4087281"/>
+            <a:ext cx="4124144" cy="646331"/>
           </a:xfrm>
           <a:prstGeom prst="rect">
             <a:avLst/>
@@ -3317,10 +3321,14 @@
           </a:bodyPr>
           <a:lstStyle/>
           <a:p>
-            <a:pPr algn="r"/>
+            <a:pPr algn="ctr"/>
+            <a:r>
+              <a:rPr lang="en-US" b="1" dirty="0"/>
+              <a:t>c3) </a:t>
+            </a:r>
             <a:r>
               <a:rPr lang="en-US" dirty="0"/>
-              <a:t>C3) Use ages of congruent nodes to </a:t>
+              <a:t>Use ages of congruent nodes to </a:t>
             </a:r>
             <a:r>
               <a:rPr lang="en-US" b="1" dirty="0"/>
@@ -3938,7 +3946,7 @@
         </p:nvSpPr>
         <p:spPr>
           <a:xfrm rot="10800000" flipV="1">
-            <a:off x="9008105" y="4531797"/>
+            <a:off x="8924066" y="4531588"/>
             <a:ext cx="958778" cy="389958"/>
           </a:xfrm>
           <a:prstGeom prst="rightArrow">
@@ -4135,8 +4143,12 @@
           <a:lstStyle/>
           <a:p>
             <a:r>
+              <a:rPr lang="en-US" b="1" dirty="0"/>
+              <a:t>a2) </a:t>
+            </a:r>
+            <a:r>
               <a:rPr lang="en-US" dirty="0"/>
-              <a:t>A2) Process taxon names with </a:t>
+              <a:t>Process taxon names with </a:t>
             </a:r>
             <a:r>
               <a:rPr lang="en-US" b="1" dirty="0"/>
@@ -4329,8 +4341,12 @@
           <a:lstStyle/>
           <a:p>
             <a:r>
+              <a:rPr lang="en-US" b="1" dirty="0"/>
+              <a:t>a1) </a:t>
+            </a:r>
+            <a:r>
               <a:rPr lang="en-US" dirty="0"/>
-              <a:t>A1) User provides a list of </a:t>
+              <a:t>User provides a list of </a:t>
             </a:r>
             <a:r>
               <a:rPr lang="en-US" b="1" dirty="0"/>
@@ -4417,7 +4433,7 @@
         <p:spPr>
           <a:xfrm>
             <a:off x="28889" y="36098"/>
-            <a:ext cx="4039079" cy="3399647"/>
+            <a:ext cx="4039079" cy="3593793"/>
           </a:xfrm>
           <a:prstGeom prst="roundRect">
             <a:avLst/>
@@ -4488,8 +4504,12 @@
           <a:lstStyle/>
           <a:p>
             <a:r>
+              <a:rPr lang="en-US" b="1" dirty="0"/>
+              <a:t>b2) </a:t>
+            </a:r>
+            <a:r>
               <a:rPr lang="en-US" dirty="0"/>
-              <a:t>B2) Prune matching chronograms and save as </a:t>
+              <a:t>Prune matching chronograms and save as </a:t>
             </a:r>
             <a:r>
               <a:rPr lang="en-US" b="1" dirty="0"/>
@@ -4724,7 +4744,7 @@
         <p:spPr>
           <a:xfrm>
             <a:off x="4931525" y="589376"/>
-            <a:ext cx="4749312" cy="646331"/>
+            <a:ext cx="4723386" cy="646331"/>
           </a:xfrm>
           <a:prstGeom prst="rect">
             <a:avLst/>
@@ -4738,8 +4758,12 @@
           <a:lstStyle/>
           <a:p>
             <a:r>
+              <a:rPr lang="en-US" b="1" dirty="0"/>
+              <a:t>b1) </a:t>
+            </a:r>
+            <a:r>
               <a:rPr lang="en-US" dirty="0"/>
-              <a:t>B1) Search </a:t>
+              <a:t>Search </a:t>
             </a:r>
             <a:r>
               <a:rPr lang="en-US" b="1" dirty="0"/>
@@ -4778,7 +4802,7 @@
         </p:nvSpPr>
         <p:spPr>
           <a:xfrm flipV="1">
-            <a:off x="8902371" y="735178"/>
+            <a:off x="8791689" y="749973"/>
             <a:ext cx="958778" cy="389958"/>
           </a:xfrm>
           <a:prstGeom prst="rightArrow">
@@ -4916,7 +4940,7 @@
             <a:pPr algn="ctr"/>
             <a:r>
               <a:rPr lang="en-US" sz="2000" b="1" dirty="0"/>
-              <a:t>B) Searching </a:t>
+              <a:t>b) Searching </a:t>
             </a:r>
             <a:r>
               <a:rPr lang="en-US" sz="2000" b="1" dirty="0" err="1"/>
@@ -5641,7 +5665,7 @@
             <a:pPr algn="ctr"/>
             <a:r>
               <a:rPr lang="en-US" sz="2000" b="1" dirty="0"/>
-              <a:t>A) Creating a </a:t>
+              <a:t>a) Creating a </a:t>
             </a:r>
             <a:r>
               <a:rPr lang="en-US" sz="2000" b="1" dirty="0" err="1"/>
@@ -5685,7 +5709,15 @@
             <a:pPr algn="ctr"/>
             <a:r>
               <a:rPr lang="en-US" sz="2000" b="1" dirty="0"/>
-              <a:t>C) Summarizing </a:t>
+              <a:t>c</a:t>
+            </a:r>
+            <a:r>
+              <a:rPr lang="en-US" sz="2000" b="1"/>
+              <a:t>) </a:t>
+            </a:r>
+            <a:r>
+              <a:rPr lang="en-US" sz="2000" b="1" dirty="0"/>
+              <a:t>Summarizing </a:t>
             </a:r>
             <a:r>
               <a:rPr lang="en-US" sz="2000" b="1" dirty="0" err="1"/>

</xml_diff>